<commit_message>
Add some img to examples
</commit_message>
<xml_diff>
--- a/img/ex_results_addisAbaba.pptx
+++ b/img/ex_results_addisAbaba.pptx
@@ -106,6 +106,11 @@
       </a:defRPr>
     </a:lvl9pPr>
   </p:defaultTextStyle>
+  <p:extLst>
+    <p:ext uri="{EFAFB233-063F-42B5-8137-9DF3F51BA10A}">
+      <p15:sldGuideLst xmlns:p15="http://schemas.microsoft.com/office/powerpoint/2012/main"/>
+    </p:ext>
+  </p:extLst>
 </p:presentation>
 </file>
 
@@ -3358,10 +3363,10 @@
         </p:nvGrpSpPr>
         <p:grpSpPr>
           <a:xfrm>
-            <a:off x="1747010" y="406006"/>
-            <a:ext cx="7509747" cy="5030429"/>
-            <a:chOff x="1747010" y="406006"/>
-            <a:chExt cx="7509747" cy="5030429"/>
+            <a:off x="1877816" y="740356"/>
+            <a:ext cx="7378941" cy="4696079"/>
+            <a:chOff x="1877816" y="740356"/>
+            <a:chExt cx="7378941" cy="4696079"/>
           </a:xfrm>
         </p:grpSpPr>
         <p:grpSp>
@@ -3507,46 +3512,6 @@
         </p:pic>
         <p:sp>
           <p:nvSpPr>
-            <p:cNvPr id="15" name="TextBox 14">
-              <a:extLst>
-                <a:ext uri="{FF2B5EF4-FFF2-40B4-BE49-F238E27FC236}">
-                  <a16:creationId xmlns:a16="http://schemas.microsoft.com/office/drawing/2014/main" id="{EE6B0E2D-68D6-43B2-A610-0CCF52D927E4}"/>
-                </a:ext>
-              </a:extLst>
-            </p:cNvPr>
-            <p:cNvSpPr txBox="1"/>
-            <p:nvPr/>
-          </p:nvSpPr>
-          <p:spPr>
-            <a:xfrm>
-              <a:off x="1747010" y="406006"/>
-              <a:ext cx="1906291" cy="369332"/>
-            </a:xfrm>
-            <a:prstGeom prst="rect">
-              <a:avLst/>
-            </a:prstGeom>
-            <a:noFill/>
-          </p:spPr>
-          <p:txBody>
-            <a:bodyPr wrap="none" rtlCol="0">
-              <a:spAutoFit/>
-            </a:bodyPr>
-            <a:lstStyle/>
-            <a:p>
-              <a:r>
-                <a:rPr lang="fr-CH" b="1" u="sng" dirty="0"/>
-                <a:t>Mobility </a:t>
-              </a:r>
-              <a:r>
-                <a:rPr lang="fr-CH" b="1" u="sng" dirty="0" err="1"/>
-                <a:t>Demand</a:t>
-              </a:r>
-              <a:endParaRPr lang="fr-CH" b="1" u="sng" dirty="0"/>
-            </a:p>
-          </p:txBody>
-        </p:sp>
-        <p:sp>
-          <p:nvSpPr>
             <p:cNvPr id="16" name="TextBox 15">
               <a:extLst>
                 <a:ext uri="{FF2B5EF4-FFF2-40B4-BE49-F238E27FC236}">
@@ -3715,56 +3680,12 @@
         </p:nvGrpSpPr>
         <p:grpSpPr>
           <a:xfrm>
-            <a:off x="1583244" y="406006"/>
-            <a:ext cx="9399932" cy="5196352"/>
-            <a:chOff x="1583244" y="406006"/>
-            <a:chExt cx="9399932" cy="5196352"/>
+            <a:off x="1583244" y="941261"/>
+            <a:ext cx="9399932" cy="4661097"/>
+            <a:chOff x="1583244" y="941261"/>
+            <a:chExt cx="9399932" cy="4661097"/>
           </a:xfrm>
         </p:grpSpPr>
-        <p:sp>
-          <p:nvSpPr>
-            <p:cNvPr id="15" name="TextBox 14">
-              <a:extLst>
-                <a:ext uri="{FF2B5EF4-FFF2-40B4-BE49-F238E27FC236}">
-                  <a16:creationId xmlns:a16="http://schemas.microsoft.com/office/drawing/2014/main" id="{EE6B0E2D-68D6-43B2-A610-0CCF52D927E4}"/>
-                </a:ext>
-              </a:extLst>
-            </p:cNvPr>
-            <p:cNvSpPr txBox="1"/>
-            <p:nvPr/>
-          </p:nvSpPr>
-          <p:spPr>
-            <a:xfrm>
-              <a:off x="1747010" y="406006"/>
-              <a:ext cx="1882760" cy="369332"/>
-            </a:xfrm>
-            <a:prstGeom prst="rect">
-              <a:avLst/>
-            </a:prstGeom>
-            <a:noFill/>
-          </p:spPr>
-          <p:txBody>
-            <a:bodyPr wrap="none" rtlCol="0">
-              <a:spAutoFit/>
-            </a:bodyPr>
-            <a:lstStyle/>
-            <a:p>
-              <a:r>
-                <a:rPr lang="fr-CH" b="1" u="sng" dirty="0" err="1"/>
-                <a:t>Charging</a:t>
-              </a:r>
-              <a:r>
-                <a:rPr lang="fr-CH" b="1" u="sng" dirty="0"/>
-                <a:t> </a:t>
-              </a:r>
-              <a:r>
-                <a:rPr lang="fr-CH" b="1" u="sng" dirty="0" err="1"/>
-                <a:t>Demand</a:t>
-              </a:r>
-              <a:endParaRPr lang="fr-CH" b="1" u="sng" dirty="0"/>
-            </a:p>
-          </p:txBody>
-        </p:sp>
         <p:sp>
           <p:nvSpPr>
             <p:cNvPr id="16" name="TextBox 15">
@@ -4078,52 +3999,12 @@
         </p:nvGrpSpPr>
         <p:grpSpPr>
           <a:xfrm>
-            <a:off x="1247776" y="406006"/>
-            <a:ext cx="5253358" cy="4978777"/>
-            <a:chOff x="1247776" y="406006"/>
-            <a:chExt cx="5253358" cy="4978777"/>
+            <a:off x="1247776" y="775338"/>
+            <a:ext cx="5253358" cy="4609445"/>
+            <a:chOff x="1247776" y="775338"/>
+            <a:chExt cx="5253358" cy="4609445"/>
           </a:xfrm>
         </p:grpSpPr>
-        <p:sp>
-          <p:nvSpPr>
-            <p:cNvPr id="15" name="TextBox 14">
-              <a:extLst>
-                <a:ext uri="{FF2B5EF4-FFF2-40B4-BE49-F238E27FC236}">
-                  <a16:creationId xmlns:a16="http://schemas.microsoft.com/office/drawing/2014/main" id="{EE6B0E2D-68D6-43B2-A610-0CCF52D927E4}"/>
-                </a:ext>
-              </a:extLst>
-            </p:cNvPr>
-            <p:cNvSpPr txBox="1"/>
-            <p:nvPr/>
-          </p:nvSpPr>
-          <p:spPr>
-            <a:xfrm>
-              <a:off x="1747010" y="406006"/>
-              <a:ext cx="2485873" cy="369332"/>
-            </a:xfrm>
-            <a:prstGeom prst="rect">
-              <a:avLst/>
-            </a:prstGeom>
-            <a:noFill/>
-          </p:spPr>
-          <p:txBody>
-            <a:bodyPr wrap="none" rtlCol="0">
-              <a:spAutoFit/>
-            </a:bodyPr>
-            <a:lstStyle/>
-            <a:p>
-              <a:r>
-                <a:rPr lang="fr-CH" b="1" u="sng" dirty="0"/>
-                <a:t>EV-PV </a:t>
-              </a:r>
-              <a:r>
-                <a:rPr lang="fr-CH" b="1" u="sng" dirty="0" err="1"/>
-                <a:t>Complementarity</a:t>
-              </a:r>
-              <a:endParaRPr lang="fr-CH" b="1" u="sng" dirty="0"/>
-            </a:p>
-          </p:txBody>
-        </p:sp>
         <p:sp>
           <p:nvSpPr>
             <p:cNvPr id="16" name="TextBox 15">

</xml_diff>